<commit_message>
- Modified several Tips on SumaryAudit Table. - Improved MEContext table header alligment for better readability. - SummaryAudit table now color in grey all rows whose Value column is 0. - Updated Documentation to align with the latest changes.
</commit_message>
<xml_diff>
--- a/help/User-Guide-SSB-Retuning-Automations-v0.7.7.pptx
+++ b/help/User-Guide-SSB-Retuning-Automations-v0.7.7.pptx
@@ -10622,7 +10622,7 @@
                         </a:defRPr>
                       </a:pPr>
                       <a:r>
-                        <a:t>Nodes with Step2b pending</a:t>
+                        <a:t>Nodes with N77A Step2b pending</a:t>
                       </a:r>
                     </a:p>
                   </a:txBody>
@@ -10712,7 +10712,7 @@
                         </a:defRPr>
                       </a:pPr>
                       <a:r>
-                        <a:t>Nodes with Step2b completed</a:t>
+                        <a:t>Nodes with N77A Step2b completed</a:t>
                       </a:r>
                     </a:p>
                   </a:txBody>
@@ -10963,7 +10963,7 @@
                         </a:defRPr>
                       </a:pPr>
                       <a:r>
-                        <a:t>Nodes with Step2b pending</a:t>
+                        <a:t>Nodes with N77B Step2b pending</a:t>
                       </a:r>
                     </a:p>
                   </a:txBody>
@@ -11053,7 +11053,7 @@
                         </a:defRPr>
                       </a:pPr>
                       <a:r>
-                        <a:t>Nodes with Step2b completed</a:t>
+                        <a:t>Nodes with NttB Step2b completed</a:t>
                       </a:r>
                     </a:p>
                   </a:txBody>
@@ -11390,6 +11390,9 @@
                           </a:solidFill>
                         </a:defRPr>
                       </a:pPr>
+                      <a:r>
+                        <a:t>Need to run Step1 on these nodes</a:t>
+                      </a:r>
                     </a:p>
                   </a:txBody>
                   <a:tcPr>
@@ -13017,9 +13020,6 @@
                           </a:solidFill>
                         </a:defRPr>
                       </a:pPr>
-                      <a:r>
-                        <a:t>Need to run Step1 on these nodes</a:t>
-                      </a:r>
                     </a:p>
                   </a:txBody>
                   <a:tcPr/>
@@ -13277,7 +13277,7 @@
                         </a:defRPr>
                       </a:pPr>
                       <a:r>
-                        <a:t>Need to run Step1 on this nodes</a:t>
+                        <a:t>Need to run Step1 on these nodes</a:t>
                       </a:r>
                     </a:p>
                   </a:txBody>
@@ -13340,7 +13340,7 @@
                         </a:defRPr>
                       </a:pPr>
                       <a:r>
-                        <a:t>LTE nodes with some cells missing relations to new SSB  (647328)</a:t>
+                        <a:t>LTE nodes with some cells missing relations to new SSB (647328)</a:t>
                       </a:r>
                     </a:p>
                   </a:txBody>
@@ -13358,6 +13358,9 @@
                           </a:solidFill>
                         </a:defRPr>
                       </a:pPr>
+                      <a:r>
+                        <a:t>Need to run Step1 on these nodes</a:t>
+                      </a:r>
                     </a:p>
                   </a:txBody>
                   <a:tcPr/>
@@ -13955,6 +13958,9 @@
                           </a:solidFill>
                         </a:defRPr>
                       </a:pPr>
+                      <a:r>
+                        <a:t>Post Step2 some relations pointing to other Mkts could be on old SSB. See details in table</a:t>
+                      </a:r>
                     </a:p>
                   </a:txBody>
                   <a:tcPr>
@@ -15833,7 +15839,7 @@
                         </a:defRPr>
                       </a:pPr>
                       <a:r>
-                        <a:t>Need to run Step1 on this nodes</a:t>
+                        <a:t>Need to run Step1 on this nodes if existing GUtranFreqRelation</a:t>
                       </a:r>
                     </a:p>
                   </a:txBody>

</xml_diff>